<commit_message>
Added Initial Approach Slide
</commit_message>
<xml_diff>
--- a/docs/Caleb_FinalPresentation_Inputs.pptx
+++ b/docs/Caleb_FinalPresentation_Inputs.pptx
@@ -5,7 +5,7 @@
     <p:sldMasterId id="2147483648" r:id="rId1"/>
   </p:sldMasterIdLst>
   <p:sldIdLst>
-    <p:sldId id="257" r:id="rId2"/>
+    <p:sldId id="263" r:id="rId2"/>
     <p:sldId id="258" r:id="rId3"/>
     <p:sldId id="259" r:id="rId4"/>
     <p:sldId id="260" r:id="rId5"/>
@@ -109,6 +109,11 @@
       </a:defRPr>
     </a:lvl9pPr>
   </p:defaultTextStyle>
+  <p:extLst>
+    <p:ext uri="{EFAFB233-063F-42B5-8137-9DF3F51BA10A}">
+      <p15:sldGuideLst xmlns:p15="http://schemas.microsoft.com/office/powerpoint/2012/main"/>
+    </p:ext>
+  </p:extLst>
 </p:presentation>
 </file>
 
@@ -2986,7 +2991,7 @@
           <a:p>
             <a:r>
               <a:rPr lang="en-US" dirty="0" smtClean="0"/>
-              <a:t>Outline</a:t>
+              <a:t>Initial Project Approach</a:t>
             </a:r>
             <a:endParaRPr lang="en-US" dirty="0"/>
           </a:p>
@@ -3009,31 +3014,45 @@
           <a:p>
             <a:r>
               <a:rPr lang="en-US" dirty="0" smtClean="0"/>
-              <a:t>- solution details</a:t>
-            </a:r>
-          </a:p>
-          <a:p>
-            <a:r>
-              <a:rPr lang="en-US" dirty="0" smtClean="0"/>
-              <a:t>- issues we faced</a:t>
-            </a:r>
-          </a:p>
-          <a:p>
-            <a:r>
-              <a:rPr lang="en-US" dirty="0" smtClean="0"/>
-              <a:t>- modified project (capacitance sensor)</a:t>
-            </a:r>
-          </a:p>
-          <a:p>
-            <a:r>
-              <a:rPr lang="en-US" dirty="0" smtClean="0"/>
-              <a:t>- methods to test</a:t>
-            </a:r>
-          </a:p>
-          <a:p>
-            <a:r>
-              <a:rPr lang="en-US" dirty="0" smtClean="0"/>
-              <a:t>- demo?</a:t>
+              <a:t>Android app for the user interface</a:t>
+            </a:r>
+          </a:p>
+          <a:p>
+            <a:r>
+              <a:rPr lang="en-US" dirty="0" smtClean="0"/>
+              <a:t>Use the Laird BL600 module for sensor device processing</a:t>
+            </a:r>
+          </a:p>
+          <a:p>
+            <a:r>
+              <a:rPr lang="en-US" dirty="0" smtClean="0"/>
+              <a:t>Use the MMA8653FC accelerometer for detecting movement</a:t>
+            </a:r>
+          </a:p>
+          <a:p>
+            <a:r>
+              <a:rPr lang="en-US" dirty="0" smtClean="0"/>
+              <a:t>Communication over Bluetooth Low Energy</a:t>
+            </a:r>
+          </a:p>
+          <a:p>
+            <a:r>
+              <a:rPr lang="en-US" dirty="0" smtClean="0"/>
+              <a:t>Implement a prototype on Dr. </a:t>
+            </a:r>
+            <a:r>
+              <a:rPr lang="en-US" dirty="0" err="1" smtClean="0"/>
+              <a:t>Jovanov’s</a:t>
+            </a:r>
+            <a:r>
+              <a:rPr lang="en-US" dirty="0" smtClean="0"/>
+              <a:t> development board</a:t>
+            </a:r>
+          </a:p>
+          <a:p>
+            <a:r>
+              <a:rPr lang="en-US" dirty="0" smtClean="0"/>
+              <a:t>Explore over-the-air programming of the BL600</a:t>
             </a:r>
             <a:endParaRPr lang="en-US" dirty="0"/>
           </a:p>
@@ -3042,7 +3061,7 @@
     </p:spTree>
     <p:extLst>
       <p:ext uri="{BB962C8B-B14F-4D97-AF65-F5344CB8AC3E}">
-        <p14:creationId xmlns:p14="http://schemas.microsoft.com/office/powerpoint/2010/main" val="949014151"/>
+        <p14:creationId xmlns:p14="http://schemas.microsoft.com/office/powerpoint/2010/main" val="2399712248"/>
       </p:ext>
     </p:extLst>
   </p:cSld>
@@ -3351,7 +3370,11 @@
           <a:p>
             <a:r>
               <a:rPr lang="en-US" dirty="0" smtClean="0"/>
-              <a:t>Modified Project</a:t>
+              <a:t>Modified </a:t>
+            </a:r>
+            <a:r>
+              <a:rPr lang="en-US" dirty="0" smtClean="0"/>
+              <a:t>Project Approach</a:t>
             </a:r>
             <a:endParaRPr lang="en-US" dirty="0"/>
           </a:p>

</xml_diff>